<commit_message>
v20251114 Removing Java requirement. Now uses python lib to connect to Databricks
</commit_message>
<xml_diff>
--- a/CDGC Databricks Tag Writer.pptx
+++ b/CDGC Databricks Tag Writer.pptx
@@ -7,10 +7,10 @@
     <p:sldMasterId id="2147483794" r:id="rId5"/>
   </p:sldMasterIdLst>
   <p:notesMasterIdLst>
-    <p:notesMasterId r:id="rId29"/>
+    <p:notesMasterId r:id="rId28"/>
   </p:notesMasterIdLst>
   <p:handoutMasterIdLst>
-    <p:handoutMasterId r:id="rId30"/>
+    <p:handoutMasterId r:id="rId29"/>
   </p:handoutMasterIdLst>
   <p:sldIdLst>
     <p:sldId id="288" r:id="rId6"/>
@@ -22,20 +22,19 @@
     <p:sldId id="2134807776" r:id="rId12"/>
     <p:sldId id="2134807787" r:id="rId13"/>
     <p:sldId id="2134807777" r:id="rId14"/>
-    <p:sldId id="2134807790" r:id="rId15"/>
-    <p:sldId id="2134807780" r:id="rId16"/>
-    <p:sldId id="2134807792" r:id="rId17"/>
-    <p:sldId id="2134807793" r:id="rId18"/>
-    <p:sldId id="2134807794" r:id="rId19"/>
-    <p:sldId id="2134807795" r:id="rId20"/>
-    <p:sldId id="2134807796" r:id="rId21"/>
-    <p:sldId id="2134807797" r:id="rId22"/>
-    <p:sldId id="2134807798" r:id="rId23"/>
-    <p:sldId id="2134807799" r:id="rId24"/>
-    <p:sldId id="2134807800" r:id="rId25"/>
-    <p:sldId id="2134807801" r:id="rId26"/>
-    <p:sldId id="2134807802" r:id="rId27"/>
-    <p:sldId id="267" r:id="rId28"/>
+    <p:sldId id="2134807780" r:id="rId15"/>
+    <p:sldId id="2134807792" r:id="rId16"/>
+    <p:sldId id="2134807793" r:id="rId17"/>
+    <p:sldId id="2134807794" r:id="rId18"/>
+    <p:sldId id="2134807795" r:id="rId19"/>
+    <p:sldId id="2134807796" r:id="rId20"/>
+    <p:sldId id="2134807797" r:id="rId21"/>
+    <p:sldId id="2134807798" r:id="rId22"/>
+    <p:sldId id="2134807799" r:id="rId23"/>
+    <p:sldId id="2134807800" r:id="rId24"/>
+    <p:sldId id="2134807801" r:id="rId25"/>
+    <p:sldId id="2134807802" r:id="rId26"/>
+    <p:sldId id="267" r:id="rId27"/>
   </p:sldIdLst>
   <p:sldSz cx="12188825" cy="6858000"/>
   <p:notesSz cx="7104063" cy="10234613"/>
@@ -152,7 +151,6 @@
             <p14:sldId id="2134807776"/>
             <p14:sldId id="2134807787"/>
             <p14:sldId id="2134807777"/>
-            <p14:sldId id="2134807790"/>
             <p14:sldId id="2134807780"/>
             <p14:sldId id="2134807792"/>
             <p14:sldId id="2134807793"/>
@@ -359,7 +357,7 @@
           <a:p>
             <a:fld id="{A8AF0ABA-1503-4581-BC5A-AF3D56D7DD45}" type="datetimeFigureOut">
               <a:rPr lang="en-US" smtClean="0"/>
-              <a:t>7/9/2025</a:t>
+              <a:t>11/14/2025</a:t>
             </a:fld>
             <a:endParaRPr lang="en-US"/>
           </a:p>
@@ -524,7 +522,7 @@
           <a:p>
             <a:fld id="{78186FDC-CD1E-4E7E-B1CD-1CBCCD519E8C}" type="datetimeFigureOut">
               <a:rPr lang="en-US" smtClean="0"/>
-              <a:t>7/9/2025</a:t>
+              <a:t>11/14/2025</a:t>
             </a:fld>
             <a:endParaRPr lang="en-US"/>
           </a:p>
@@ -1148,7 +1146,7 @@
           <a:p>
             <a:fld id="{4B9A8B04-59C6-4476-9B83-8806D24CC38B}" type="slidenum">
               <a:rPr lang="en-US" smtClean="0"/>
-              <a:t>19</a:t>
+              <a:t>18</a:t>
             </a:fld>
             <a:endParaRPr lang="en-US"/>
           </a:p>
@@ -1256,7 +1254,7 @@
           <a:p>
             <a:fld id="{4B9A8B04-59C6-4476-9B83-8806D24CC38B}" type="slidenum">
               <a:rPr lang="en-US" smtClean="0"/>
-              <a:t>20</a:t>
+              <a:t>19</a:t>
             </a:fld>
             <a:endParaRPr lang="en-US"/>
           </a:p>
@@ -1364,7 +1362,7 @@
           <a:p>
             <a:fld id="{4B9A8B04-59C6-4476-9B83-8806D24CC38B}" type="slidenum">
               <a:rPr lang="en-US" smtClean="0"/>
-              <a:t>21</a:t>
+              <a:t>20</a:t>
             </a:fld>
             <a:endParaRPr lang="en-US"/>
           </a:p>
@@ -1472,7 +1470,7 @@
           <a:p>
             <a:fld id="{4B9A8B04-59C6-4476-9B83-8806D24CC38B}" type="slidenum">
               <a:rPr lang="en-US" smtClean="0"/>
-              <a:t>22</a:t>
+              <a:t>21</a:t>
             </a:fld>
             <a:endParaRPr lang="en-US"/>
           </a:p>
@@ -1556,7 +1554,7 @@
           <a:p>
             <a:fld id="{4B9A8B04-59C6-4476-9B83-8806D24CC38B}" type="slidenum">
               <a:rPr lang="en-US" smtClean="0"/>
-              <a:t>23</a:t>
+              <a:t>22</a:t>
             </a:fld>
             <a:endParaRPr lang="en-US"/>
           </a:p>
@@ -22957,154 +22955,6 @@
           <a:p>
             <a:r>
               <a:rPr lang="en-US" dirty="0"/>
-              <a:t>Setup Step 5</a:t>
-            </a:r>
-            <a:endParaRPr lang="en-IN" dirty="0"/>
-          </a:p>
-        </p:txBody>
-      </p:sp>
-      <p:sp>
-        <p:nvSpPr>
-          <p:cNvPr id="6" name="TextBox 5">
-            <a:extLst>
-              <a:ext uri="{FF2B5EF4-FFF2-40B4-BE49-F238E27FC236}">
-                <a16:creationId xmlns:a16="http://schemas.microsoft.com/office/drawing/2014/main" id="{9F8FFC18-4FD7-5E97-CCB3-5E13CE612AEB}"/>
-              </a:ext>
-            </a:extLst>
-          </p:cNvPr>
-          <p:cNvSpPr txBox="1"/>
-          <p:nvPr/>
-        </p:nvSpPr>
-        <p:spPr>
-          <a:xfrm>
-            <a:off x="1068870" y="1045029"/>
-            <a:ext cx="10022383" cy="2296885"/>
-          </a:xfrm>
-          <a:prstGeom prst="rect">
-            <a:avLst/>
-          </a:prstGeom>
-          <a:noFill/>
-        </p:spPr>
-        <p:txBody>
-          <a:bodyPr wrap="square" lIns="0" tIns="0" rIns="0" bIns="0" rtlCol="0">
-            <a:noAutofit/>
-          </a:bodyPr>
-          <a:lstStyle/>
-          <a:p>
-            <a:pPr>
-              <a:lnSpc>
-                <a:spcPct val="90000"/>
-              </a:lnSpc>
-              <a:spcAft>
-                <a:spcPts val="1000"/>
-              </a:spcAft>
-            </a:pPr>
-            <a:r>
-              <a:rPr lang="en-US" dirty="0">
-                <a:latin typeface="Roboto" charset="0"/>
-                <a:ea typeface="Roboto" charset="0"/>
-                <a:cs typeface="Roboto" charset="0"/>
-              </a:rPr>
-              <a:t>This script uses a JDBC connection, so ensure that you have a JAVA_HOME set</a:t>
-            </a:r>
-          </a:p>
-        </p:txBody>
-      </p:sp>
-      <p:pic>
-        <p:nvPicPr>
-          <p:cNvPr id="3" name="Picture 2">
-            <a:extLst>
-              <a:ext uri="{FF2B5EF4-FFF2-40B4-BE49-F238E27FC236}">
-                <a16:creationId xmlns:a16="http://schemas.microsoft.com/office/drawing/2014/main" id="{95B8C900-C15F-9A27-5208-AE9B5A355528}"/>
-              </a:ext>
-            </a:extLst>
-          </p:cNvPr>
-          <p:cNvPicPr>
-            <a:picLocks noChangeAspect="1"/>
-          </p:cNvPicPr>
-          <p:nvPr/>
-        </p:nvPicPr>
-        <p:blipFill>
-          <a:blip r:embed="rId2"/>
-          <a:stretch>
-            <a:fillRect/>
-          </a:stretch>
-        </p:blipFill>
-        <p:spPr>
-          <a:xfrm>
-            <a:off x="3842775" y="3341914"/>
-            <a:ext cx="3808294" cy="699179"/>
-          </a:xfrm>
-          <a:prstGeom prst="rect">
-            <a:avLst/>
-          </a:prstGeom>
-        </p:spPr>
-      </p:pic>
-    </p:spTree>
-    <p:extLst>
-      <p:ext uri="{BB962C8B-B14F-4D97-AF65-F5344CB8AC3E}">
-        <p14:creationId xmlns:p14="http://schemas.microsoft.com/office/powerpoint/2010/main" val="1144679010"/>
-      </p:ext>
-    </p:extLst>
-  </p:cSld>
-  <p:clrMapOvr>
-    <a:masterClrMapping/>
-  </p:clrMapOvr>
-  <mc:AlternateContent xmlns:mc="http://schemas.openxmlformats.org/markup-compatibility/2006" xmlns:p14="http://schemas.microsoft.com/office/powerpoint/2010/main">
-    <mc:Choice Requires="p14">
-      <p:transition spd="med" p14:dur="700" advClick="0">
-        <p:fade/>
-      </p:transition>
-    </mc:Choice>
-    <mc:Fallback xmlns="">
-      <p:transition spd="med" advClick="0">
-        <p:fade/>
-      </p:transition>
-    </mc:Fallback>
-  </mc:AlternateContent>
-</p:sld>
-</file>
-
-<file path=ppt/slides/slide11.xml><?xml version="1.0" encoding="utf-8"?>
-<p:sld xmlns:a="http://schemas.openxmlformats.org/drawingml/2006/main" xmlns:r="http://schemas.openxmlformats.org/officeDocument/2006/relationships" xmlns:p="http://schemas.openxmlformats.org/presentationml/2006/main">
-  <p:cSld>
-    <p:spTree>
-      <p:nvGrpSpPr>
-        <p:cNvPr id="1" name=""/>
-        <p:cNvGrpSpPr/>
-        <p:nvPr/>
-      </p:nvGrpSpPr>
-      <p:grpSpPr>
-        <a:xfrm>
-          <a:off x="0" y="0"/>
-          <a:ext cx="0" cy="0"/>
-          <a:chOff x="0" y="0"/>
-          <a:chExt cx="0" cy="0"/>
-        </a:xfrm>
-      </p:grpSpPr>
-      <p:sp>
-        <p:nvSpPr>
-          <p:cNvPr id="5" name="Title 4">
-            <a:extLst>
-              <a:ext uri="{FF2B5EF4-FFF2-40B4-BE49-F238E27FC236}">
-                <a16:creationId xmlns:a16="http://schemas.microsoft.com/office/drawing/2014/main" id="{C2B479B7-4E1E-475F-B459-5CE8B05302D3}"/>
-              </a:ext>
-            </a:extLst>
-          </p:cNvPr>
-          <p:cNvSpPr>
-            <a:spLocks noGrp="1"/>
-          </p:cNvSpPr>
-          <p:nvPr>
-            <p:ph type="title"/>
-          </p:nvPr>
-        </p:nvSpPr>
-        <p:spPr/>
-        <p:txBody>
-          <a:bodyPr/>
-          <a:lstStyle/>
-          <a:p>
-            <a:r>
-              <a:rPr lang="en-US" dirty="0"/>
               <a:t>Running</a:t>
             </a:r>
             <a:endParaRPr lang="en-IN" dirty="0"/>
@@ -23345,7 +23195,7 @@
 </p:sld>
 </file>
 
-<file path=ppt/slides/slide12.xml><?xml version="1.0" encoding="utf-8"?>
+<file path=ppt/slides/slide11.xml><?xml version="1.0" encoding="utf-8"?>
 <p:sld xmlns:a="http://schemas.openxmlformats.org/drawingml/2006/main" xmlns:r="http://schemas.openxmlformats.org/officeDocument/2006/relationships" xmlns:p="http://schemas.openxmlformats.org/presentationml/2006/main">
   <p:cSld>
     <p:spTree>
@@ -23863,7 +23713,7 @@
 </p:sld>
 </file>
 
-<file path=ppt/slides/slide13.xml><?xml version="1.0" encoding="utf-8"?>
+<file path=ppt/slides/slide12.xml><?xml version="1.0" encoding="utf-8"?>
 <p:sld xmlns:a="http://schemas.openxmlformats.org/drawingml/2006/main" xmlns:r="http://schemas.openxmlformats.org/officeDocument/2006/relationships" xmlns:p="http://schemas.openxmlformats.org/presentationml/2006/main">
   <p:cSld>
     <p:spTree>
@@ -24420,7 +24270,7 @@
 </p:sld>
 </file>
 
-<file path=ppt/slides/slide14.xml><?xml version="1.0" encoding="utf-8"?>
+<file path=ppt/slides/slide13.xml><?xml version="1.0" encoding="utf-8"?>
 <p:sld xmlns:a="http://schemas.openxmlformats.org/drawingml/2006/main" xmlns:r="http://schemas.openxmlformats.org/officeDocument/2006/relationships" xmlns:p="http://schemas.openxmlformats.org/presentationml/2006/main">
   <p:cSld>
     <p:spTree>
@@ -24926,7 +24776,7 @@
 </p:sld>
 </file>
 
-<file path=ppt/slides/slide15.xml><?xml version="1.0" encoding="utf-8"?>
+<file path=ppt/slides/slide14.xml><?xml version="1.0" encoding="utf-8"?>
 <p:sld xmlns:a="http://schemas.openxmlformats.org/drawingml/2006/main" xmlns:r="http://schemas.openxmlformats.org/officeDocument/2006/relationships" xmlns:p="http://schemas.openxmlformats.org/presentationml/2006/main">
   <p:cSld>
     <p:spTree>
@@ -25445,7 +25295,7 @@
 </p:sld>
 </file>
 
-<file path=ppt/slides/slide16.xml><?xml version="1.0" encoding="utf-8"?>
+<file path=ppt/slides/slide15.xml><?xml version="1.0" encoding="utf-8"?>
 <p:sld xmlns:a="http://schemas.openxmlformats.org/drawingml/2006/main" xmlns:r="http://schemas.openxmlformats.org/officeDocument/2006/relationships" xmlns:p="http://schemas.openxmlformats.org/presentationml/2006/main">
   <p:cSld>
     <p:spTree>
@@ -25837,7 +25687,7 @@
 </p:sld>
 </file>
 
-<file path=ppt/slides/slide17.xml><?xml version="1.0" encoding="utf-8"?>
+<file path=ppt/slides/slide16.xml><?xml version="1.0" encoding="utf-8"?>
 <p:sld xmlns:a="http://schemas.openxmlformats.org/drawingml/2006/main" xmlns:r="http://schemas.openxmlformats.org/officeDocument/2006/relationships" xmlns:p="http://schemas.openxmlformats.org/presentationml/2006/main">
   <p:cSld>
     <p:spTree>
@@ -26328,7 +26178,7 @@
 </p:sld>
 </file>
 
-<file path=ppt/slides/slide18.xml><?xml version="1.0" encoding="utf-8"?>
+<file path=ppt/slides/slide17.xml><?xml version="1.0" encoding="utf-8"?>
 <p:sld xmlns:a="http://schemas.openxmlformats.org/drawingml/2006/main" xmlns:r="http://schemas.openxmlformats.org/officeDocument/2006/relationships" xmlns:p="http://schemas.openxmlformats.org/presentationml/2006/main">
   <p:cSld>
     <p:spTree>
@@ -26862,7 +26712,7 @@
 </p:sld>
 </file>
 
-<file path=ppt/slides/slide19.xml><?xml version="1.0" encoding="utf-8"?>
+<file path=ppt/slides/slide18.xml><?xml version="1.0" encoding="utf-8"?>
 <p:sld xmlns:a="http://schemas.openxmlformats.org/drawingml/2006/main" xmlns:r="http://schemas.openxmlformats.org/officeDocument/2006/relationships" xmlns:p="http://schemas.openxmlformats.org/presentationml/2006/main">
   <p:cSld>
     <p:spTree>
@@ -27298,6 +27148,567 @@
     <p:extLst>
       <p:ext uri="{BB962C8B-B14F-4D97-AF65-F5344CB8AC3E}">
         <p14:creationId xmlns:p14="http://schemas.microsoft.com/office/powerpoint/2010/main" val="3542068506"/>
+      </p:ext>
+    </p:extLst>
+  </p:cSld>
+  <p:clrMapOvr>
+    <a:masterClrMapping/>
+  </p:clrMapOvr>
+  <mc:AlternateContent xmlns:mc="http://schemas.openxmlformats.org/markup-compatibility/2006" xmlns:p14="http://schemas.microsoft.com/office/powerpoint/2010/main">
+    <mc:Choice Requires="p14">
+      <p:transition spd="med" p14:dur="700" advClick="0">
+        <p:fade/>
+      </p:transition>
+    </mc:Choice>
+    <mc:Fallback xmlns="">
+      <p:transition spd="med" advClick="0">
+        <p:fade/>
+      </p:transition>
+    </mc:Fallback>
+  </mc:AlternateContent>
+</p:sld>
+</file>
+
+<file path=ppt/slides/slide19.xml><?xml version="1.0" encoding="utf-8"?>
+<p:sld xmlns:a="http://schemas.openxmlformats.org/drawingml/2006/main" xmlns:r="http://schemas.openxmlformats.org/officeDocument/2006/relationships" xmlns:p="http://schemas.openxmlformats.org/presentationml/2006/main">
+  <p:cSld>
+    <p:spTree>
+      <p:nvGrpSpPr>
+        <p:cNvPr id="1" name="">
+          <a:extLst>
+            <a:ext uri="{FF2B5EF4-FFF2-40B4-BE49-F238E27FC236}">
+              <a16:creationId xmlns:a16="http://schemas.microsoft.com/office/drawing/2014/main" id="{6E97DB95-0030-BBE7-9EAF-AD2320A80700}"/>
+            </a:ext>
+          </a:extLst>
+        </p:cNvPr>
+        <p:cNvGrpSpPr/>
+        <p:nvPr/>
+      </p:nvGrpSpPr>
+      <p:grpSpPr>
+        <a:xfrm>
+          <a:off x="0" y="0"/>
+          <a:ext cx="0" cy="0"/>
+          <a:chOff x="0" y="0"/>
+          <a:chExt cx="0" cy="0"/>
+        </a:xfrm>
+      </p:grpSpPr>
+      <p:sp>
+        <p:nvSpPr>
+          <p:cNvPr id="5" name="Title 4">
+            <a:extLst>
+              <a:ext uri="{FF2B5EF4-FFF2-40B4-BE49-F238E27FC236}">
+                <a16:creationId xmlns:a16="http://schemas.microsoft.com/office/drawing/2014/main" id="{1DCCE66F-F0D7-5749-D059-7C2D0D00735A}"/>
+              </a:ext>
+            </a:extLst>
+          </p:cNvPr>
+          <p:cNvSpPr>
+            <a:spLocks noGrp="1"/>
+          </p:cNvSpPr>
+          <p:nvPr>
+            <p:ph type="title"/>
+          </p:nvPr>
+        </p:nvSpPr>
+        <p:spPr/>
+        <p:txBody>
+          <a:bodyPr/>
+          <a:lstStyle/>
+          <a:p>
+            <a:r>
+              <a:rPr lang="en-US" dirty="0"/>
+              <a:t>Optional Command Line Arguments (continued)</a:t>
+            </a:r>
+            <a:endParaRPr lang="en-IN" dirty="0"/>
+          </a:p>
+        </p:txBody>
+      </p:sp>
+      <p:sp>
+        <p:nvSpPr>
+          <p:cNvPr id="6" name="TextBox 5">
+            <a:extLst>
+              <a:ext uri="{FF2B5EF4-FFF2-40B4-BE49-F238E27FC236}">
+                <a16:creationId xmlns:a16="http://schemas.microsoft.com/office/drawing/2014/main" id="{1952A84B-2E7F-2DE6-FC4E-70F1B110D5C3}"/>
+              </a:ext>
+            </a:extLst>
+          </p:cNvPr>
+          <p:cNvSpPr txBox="1"/>
+          <p:nvPr/>
+        </p:nvSpPr>
+        <p:spPr>
+          <a:xfrm>
+            <a:off x="717176" y="1045029"/>
+            <a:ext cx="11195177" cy="5330369"/>
+          </a:xfrm>
+          <a:prstGeom prst="rect">
+            <a:avLst/>
+          </a:prstGeom>
+          <a:noFill/>
+        </p:spPr>
+        <p:txBody>
+          <a:bodyPr wrap="square" lIns="0" tIns="0" rIns="0" bIns="0" rtlCol="0">
+            <a:noAutofit/>
+          </a:bodyPr>
+          <a:lstStyle/>
+          <a:p>
+            <a:pPr>
+              <a:lnSpc>
+                <a:spcPct val="90000"/>
+              </a:lnSpc>
+              <a:spcAft>
+                <a:spcPts val="1000"/>
+              </a:spcAft>
+            </a:pPr>
+            <a:r>
+              <a:rPr lang="en-US" sz="1100" dirty="0">
+                <a:latin typeface="Courier New" panose="02070309020205020404" pitchFamily="49" charset="0"/>
+                <a:ea typeface="Roboto" charset="0"/>
+                <a:cs typeface="Courier New" panose="02070309020205020404" pitchFamily="49" charset="0"/>
+              </a:rPr>
+              <a:t> --</a:t>
+            </a:r>
+            <a:r>
+              <a:rPr lang="en-US" sz="1100" b="1" dirty="0" err="1">
+                <a:latin typeface="Courier New" panose="02070309020205020404" pitchFamily="49" charset="0"/>
+                <a:ea typeface="Roboto" charset="0"/>
+                <a:cs typeface="Courier New" panose="02070309020205020404" pitchFamily="49" charset="0"/>
+              </a:rPr>
+              <a:t>encrypted_jdbc_password</a:t>
+            </a:r>
+            <a:endParaRPr lang="en-US" sz="1100" b="1" dirty="0">
+              <a:latin typeface="Courier New" panose="02070309020205020404" pitchFamily="49" charset="0"/>
+              <a:ea typeface="Roboto" charset="0"/>
+              <a:cs typeface="Courier New" panose="02070309020205020404" pitchFamily="49" charset="0"/>
+            </a:endParaRPr>
+          </a:p>
+          <a:p>
+            <a:pPr>
+              <a:lnSpc>
+                <a:spcPct val="90000"/>
+              </a:lnSpc>
+              <a:spcAft>
+                <a:spcPts val="1000"/>
+              </a:spcAft>
+            </a:pPr>
+            <a:r>
+              <a:rPr lang="en-US" sz="1100" dirty="0">
+                <a:latin typeface="Courier New" panose="02070309020205020404" pitchFamily="49" charset="0"/>
+                <a:ea typeface="Roboto" charset="0"/>
+                <a:cs typeface="Courier New" panose="02070309020205020404" pitchFamily="49" charset="0"/>
+              </a:rPr>
+              <a:t>        (Databricks JDBC) Encrypted JDBC password.</a:t>
+            </a:r>
+          </a:p>
+          <a:p>
+            <a:pPr>
+              <a:lnSpc>
+                <a:spcPct val="90000"/>
+              </a:lnSpc>
+              <a:spcAft>
+                <a:spcPts val="1000"/>
+              </a:spcAft>
+            </a:pPr>
+            <a:r>
+              <a:rPr lang="en-US" sz="1100" dirty="0">
+                <a:latin typeface="Courier New" panose="02070309020205020404" pitchFamily="49" charset="0"/>
+                <a:ea typeface="Roboto" charset="0"/>
+                <a:cs typeface="Courier New" panose="02070309020205020404" pitchFamily="49" charset="0"/>
+              </a:rPr>
+              <a:t>		* See the Encryption related options to see how to create encrypted passwords</a:t>
+            </a:r>
+          </a:p>
+          <a:p>
+            <a:pPr>
+              <a:lnSpc>
+                <a:spcPct val="90000"/>
+              </a:lnSpc>
+              <a:spcAft>
+                <a:spcPts val="1000"/>
+              </a:spcAft>
+            </a:pPr>
+            <a:r>
+              <a:rPr lang="en-US" sz="1100" dirty="0">
+                <a:latin typeface="Courier New" panose="02070309020205020404" pitchFamily="49" charset="0"/>
+                <a:ea typeface="Roboto" charset="0"/>
+                <a:cs typeface="Courier New" panose="02070309020205020404" pitchFamily="49" charset="0"/>
+              </a:rPr>
+              <a:t>        If provided alongside --</a:t>
+            </a:r>
+            <a:r>
+              <a:rPr lang="en-US" sz="1100" dirty="0" err="1">
+                <a:latin typeface="Courier New" panose="02070309020205020404" pitchFamily="49" charset="0"/>
+                <a:ea typeface="Roboto" charset="0"/>
+                <a:cs typeface="Courier New" panose="02070309020205020404" pitchFamily="49" charset="0"/>
+              </a:rPr>
+              <a:t>jdbc_password</a:t>
+            </a:r>
+            <a:r>
+              <a:rPr lang="en-US" sz="1100" dirty="0">
+                <a:latin typeface="Courier New" panose="02070309020205020404" pitchFamily="49" charset="0"/>
+                <a:ea typeface="Roboto" charset="0"/>
+                <a:cs typeface="Courier New" panose="02070309020205020404" pitchFamily="49" charset="0"/>
+              </a:rPr>
+              <a:t>, this value will be used instead.</a:t>
+            </a:r>
+          </a:p>
+          <a:p>
+            <a:pPr>
+              <a:lnSpc>
+                <a:spcPct val="90000"/>
+              </a:lnSpc>
+              <a:spcAft>
+                <a:spcPts val="1000"/>
+              </a:spcAft>
+            </a:pPr>
+            <a:r>
+              <a:rPr lang="en-US" sz="1100" dirty="0">
+                <a:latin typeface="Courier New" panose="02070309020205020404" pitchFamily="49" charset="0"/>
+                <a:ea typeface="Roboto" charset="0"/>
+                <a:cs typeface="Courier New" panose="02070309020205020404" pitchFamily="49" charset="0"/>
+              </a:rPr>
+              <a:t>        The script will decrypt it automatically.</a:t>
+            </a:r>
+          </a:p>
+          <a:p>
+            <a:pPr>
+              <a:lnSpc>
+                <a:spcPct val="90000"/>
+              </a:lnSpc>
+              <a:spcAft>
+                <a:spcPts val="1000"/>
+              </a:spcAft>
+            </a:pPr>
+            <a:r>
+              <a:rPr lang="en-US" sz="1100" dirty="0">
+                <a:latin typeface="Courier New" panose="02070309020205020404" pitchFamily="49" charset="0"/>
+                <a:ea typeface="Roboto" charset="0"/>
+                <a:cs typeface="Courier New" panose="02070309020205020404" pitchFamily="49" charset="0"/>
+              </a:rPr>
+              <a:t>        Example:</a:t>
+            </a:r>
+          </a:p>
+          <a:p>
+            <a:pPr>
+              <a:lnSpc>
+                <a:spcPct val="90000"/>
+              </a:lnSpc>
+              <a:spcAft>
+                <a:spcPts val="1000"/>
+              </a:spcAft>
+            </a:pPr>
+            <a:r>
+              <a:rPr lang="en-US" sz="1100" dirty="0">
+                <a:latin typeface="Courier New" panose="02070309020205020404" pitchFamily="49" charset="0"/>
+                <a:ea typeface="Roboto" charset="0"/>
+                <a:cs typeface="Courier New" panose="02070309020205020404" pitchFamily="49" charset="0"/>
+              </a:rPr>
+              <a:t>            --</a:t>
+            </a:r>
+            <a:r>
+              <a:rPr lang="en-US" sz="1100" dirty="0" err="1">
+                <a:latin typeface="Courier New" panose="02070309020205020404" pitchFamily="49" charset="0"/>
+                <a:ea typeface="Roboto" charset="0"/>
+                <a:cs typeface="Courier New" panose="02070309020205020404" pitchFamily="49" charset="0"/>
+              </a:rPr>
+              <a:t>encrypted_jdbc_password</a:t>
+            </a:r>
+            <a:r>
+              <a:rPr lang="en-US" sz="1100" dirty="0">
+                <a:latin typeface="Courier New" panose="02070309020205020404" pitchFamily="49" charset="0"/>
+                <a:ea typeface="Roboto" charset="0"/>
+                <a:cs typeface="Courier New" panose="02070309020205020404" pitchFamily="49" charset="0"/>
+              </a:rPr>
+              <a:t>=gAAAAABn7rHu...</a:t>
+            </a:r>
+          </a:p>
+          <a:p>
+            <a:pPr>
+              <a:lnSpc>
+                <a:spcPct val="90000"/>
+              </a:lnSpc>
+              <a:spcAft>
+                <a:spcPts val="1000"/>
+              </a:spcAft>
+            </a:pPr>
+            <a:endParaRPr lang="en-US" sz="1100" dirty="0">
+              <a:latin typeface="Courier New" panose="02070309020205020404" pitchFamily="49" charset="0"/>
+              <a:ea typeface="Roboto" charset="0"/>
+              <a:cs typeface="Courier New" panose="02070309020205020404" pitchFamily="49" charset="0"/>
+            </a:endParaRPr>
+          </a:p>
+          <a:p>
+            <a:pPr>
+              <a:lnSpc>
+                <a:spcPct val="90000"/>
+              </a:lnSpc>
+              <a:spcAft>
+                <a:spcPts val="1000"/>
+              </a:spcAft>
+            </a:pPr>
+            <a:r>
+              <a:rPr lang="en-US" sz="1100" dirty="0">
+                <a:latin typeface="Courier New" panose="02070309020205020404" pitchFamily="49" charset="0"/>
+                <a:ea typeface="Roboto" charset="0"/>
+                <a:cs typeface="Courier New" panose="02070309020205020404" pitchFamily="49" charset="0"/>
+              </a:rPr>
+              <a:t> --</a:t>
+            </a:r>
+            <a:r>
+              <a:rPr lang="en-US" sz="1100" b="1" dirty="0" err="1">
+                <a:latin typeface="Courier New" panose="02070309020205020404" pitchFamily="49" charset="0"/>
+                <a:ea typeface="Roboto" charset="0"/>
+                <a:cs typeface="Courier New" panose="02070309020205020404" pitchFamily="49" charset="0"/>
+              </a:rPr>
+              <a:t>jdbc_driver_file</a:t>
+            </a:r>
+            <a:endParaRPr lang="en-US" sz="1100" b="1" dirty="0">
+              <a:latin typeface="Courier New" panose="02070309020205020404" pitchFamily="49" charset="0"/>
+              <a:ea typeface="Roboto" charset="0"/>
+              <a:cs typeface="Courier New" panose="02070309020205020404" pitchFamily="49" charset="0"/>
+            </a:endParaRPr>
+          </a:p>
+          <a:p>
+            <a:pPr>
+              <a:lnSpc>
+                <a:spcPct val="90000"/>
+              </a:lnSpc>
+              <a:spcAft>
+                <a:spcPts val="1000"/>
+              </a:spcAft>
+            </a:pPr>
+            <a:r>
+              <a:rPr lang="en-US" sz="1100" dirty="0">
+                <a:latin typeface="Courier New" panose="02070309020205020404" pitchFamily="49" charset="0"/>
+                <a:ea typeface="Roboto" charset="0"/>
+                <a:cs typeface="Courier New" panose="02070309020205020404" pitchFamily="49" charset="0"/>
+              </a:rPr>
+              <a:t>        (Databricks JDBC) File path to the JDBC driver JAR file.</a:t>
+            </a:r>
+          </a:p>
+          <a:p>
+            <a:pPr>
+              <a:lnSpc>
+                <a:spcPct val="90000"/>
+              </a:lnSpc>
+              <a:spcAft>
+                <a:spcPts val="1000"/>
+              </a:spcAft>
+            </a:pPr>
+            <a:r>
+              <a:rPr lang="en-US" sz="1100" dirty="0">
+                <a:latin typeface="Courier New" panose="02070309020205020404" pitchFamily="49" charset="0"/>
+                <a:ea typeface="Roboto" charset="0"/>
+                <a:cs typeface="Courier New" panose="02070309020205020404" pitchFamily="49" charset="0"/>
+              </a:rPr>
+              <a:t>		You can specify just a filename (which it will expect in the same directory as the python script,</a:t>
+            </a:r>
+          </a:p>
+          <a:p>
+            <a:pPr>
+              <a:lnSpc>
+                <a:spcPct val="90000"/>
+              </a:lnSpc>
+              <a:spcAft>
+                <a:spcPts val="1000"/>
+              </a:spcAft>
+            </a:pPr>
+            <a:r>
+              <a:rPr lang="en-US" sz="1100" dirty="0">
+                <a:latin typeface="Courier New" panose="02070309020205020404" pitchFamily="49" charset="0"/>
+                <a:ea typeface="Roboto" charset="0"/>
+                <a:cs typeface="Courier New" panose="02070309020205020404" pitchFamily="49" charset="0"/>
+              </a:rPr>
+              <a:t>		or you can specify a full path to where the jar file resides.</a:t>
+            </a:r>
+          </a:p>
+          <a:p>
+            <a:pPr>
+              <a:lnSpc>
+                <a:spcPct val="90000"/>
+              </a:lnSpc>
+              <a:spcAft>
+                <a:spcPts val="1000"/>
+              </a:spcAft>
+            </a:pPr>
+            <a:r>
+              <a:rPr lang="en-US" sz="1100" dirty="0">
+                <a:latin typeface="Courier New" panose="02070309020205020404" pitchFamily="49" charset="0"/>
+                <a:ea typeface="Roboto" charset="0"/>
+                <a:cs typeface="Courier New" panose="02070309020205020404" pitchFamily="49" charset="0"/>
+              </a:rPr>
+              <a:t>        Example:</a:t>
+            </a:r>
+          </a:p>
+          <a:p>
+            <a:pPr>
+              <a:lnSpc>
+                <a:spcPct val="90000"/>
+              </a:lnSpc>
+              <a:spcAft>
+                <a:spcPts val="1000"/>
+              </a:spcAft>
+            </a:pPr>
+            <a:r>
+              <a:rPr lang="en-US" sz="1100" dirty="0">
+                <a:latin typeface="Courier New" panose="02070309020205020404" pitchFamily="49" charset="0"/>
+                <a:ea typeface="Roboto" charset="0"/>
+                <a:cs typeface="Courier New" panose="02070309020205020404" pitchFamily="49" charset="0"/>
+              </a:rPr>
+              <a:t>            --</a:t>
+            </a:r>
+            <a:r>
+              <a:rPr lang="en-US" sz="1100" dirty="0" err="1">
+                <a:latin typeface="Courier New" panose="02070309020205020404" pitchFamily="49" charset="0"/>
+                <a:ea typeface="Roboto" charset="0"/>
+                <a:cs typeface="Courier New" panose="02070309020205020404" pitchFamily="49" charset="0"/>
+              </a:rPr>
+              <a:t>jdbc_driver_file</a:t>
+            </a:r>
+            <a:r>
+              <a:rPr lang="en-US" sz="1100" dirty="0">
+                <a:latin typeface="Courier New" panose="02070309020205020404" pitchFamily="49" charset="0"/>
+                <a:ea typeface="Roboto" charset="0"/>
+                <a:cs typeface="Courier New" panose="02070309020205020404" pitchFamily="49" charset="0"/>
+              </a:rPr>
+              <a:t>=./DatabricksJDBC42.jar</a:t>
+            </a:r>
+          </a:p>
+          <a:p>
+            <a:pPr>
+              <a:lnSpc>
+                <a:spcPct val="90000"/>
+              </a:lnSpc>
+              <a:spcAft>
+                <a:spcPts val="1000"/>
+              </a:spcAft>
+            </a:pPr>
+            <a:endParaRPr lang="en-US" sz="1100" dirty="0">
+              <a:latin typeface="Courier New" panose="02070309020205020404" pitchFamily="49" charset="0"/>
+              <a:ea typeface="Roboto" charset="0"/>
+              <a:cs typeface="Courier New" panose="02070309020205020404" pitchFamily="49" charset="0"/>
+            </a:endParaRPr>
+          </a:p>
+          <a:p>
+            <a:pPr>
+              <a:lnSpc>
+                <a:spcPct val="90000"/>
+              </a:lnSpc>
+              <a:spcAft>
+                <a:spcPts val="1000"/>
+              </a:spcAft>
+            </a:pPr>
+            <a:r>
+              <a:rPr lang="en-US" sz="1100" dirty="0">
+                <a:latin typeface="Courier New" panose="02070309020205020404" pitchFamily="49" charset="0"/>
+                <a:ea typeface="Roboto" charset="0"/>
+                <a:cs typeface="Courier New" panose="02070309020205020404" pitchFamily="49" charset="0"/>
+              </a:rPr>
+              <a:t> --</a:t>
+            </a:r>
+            <a:r>
+              <a:rPr lang="en-US" sz="1100" b="1" dirty="0" err="1">
+                <a:latin typeface="Courier New" panose="02070309020205020404" pitchFamily="49" charset="0"/>
+                <a:ea typeface="Roboto" charset="0"/>
+                <a:cs typeface="Courier New" panose="02070309020205020404" pitchFamily="49" charset="0"/>
+              </a:rPr>
+              <a:t>databricks_pre_statements</a:t>
+            </a:r>
+            <a:endParaRPr lang="en-US" sz="1100" b="1" dirty="0">
+              <a:latin typeface="Courier New" panose="02070309020205020404" pitchFamily="49" charset="0"/>
+              <a:ea typeface="Roboto" charset="0"/>
+              <a:cs typeface="Courier New" panose="02070309020205020404" pitchFamily="49" charset="0"/>
+            </a:endParaRPr>
+          </a:p>
+          <a:p>
+            <a:pPr>
+              <a:lnSpc>
+                <a:spcPct val="90000"/>
+              </a:lnSpc>
+              <a:spcAft>
+                <a:spcPts val="1000"/>
+              </a:spcAft>
+            </a:pPr>
+            <a:r>
+              <a:rPr lang="en-US" sz="1100" dirty="0">
+                <a:latin typeface="Courier New" panose="02070309020205020404" pitchFamily="49" charset="0"/>
+                <a:ea typeface="Roboto" charset="0"/>
+                <a:cs typeface="Courier New" panose="02070309020205020404" pitchFamily="49" charset="0"/>
+              </a:rPr>
+              <a:t>        (Databricks) List of SQL statements to execute prior to main operations.</a:t>
+            </a:r>
+          </a:p>
+          <a:p>
+            <a:pPr>
+              <a:lnSpc>
+                <a:spcPct val="90000"/>
+              </a:lnSpc>
+              <a:spcAft>
+                <a:spcPts val="1000"/>
+              </a:spcAft>
+            </a:pPr>
+            <a:r>
+              <a:rPr lang="en-US" sz="1100" dirty="0">
+                <a:latin typeface="Courier New" panose="02070309020205020404" pitchFamily="49" charset="0"/>
+                <a:ea typeface="Roboto" charset="0"/>
+                <a:cs typeface="Courier New" panose="02070309020205020404" pitchFamily="49" charset="0"/>
+              </a:rPr>
+              <a:t>        Example:</a:t>
+            </a:r>
+          </a:p>
+          <a:p>
+            <a:pPr>
+              <a:lnSpc>
+                <a:spcPct val="90000"/>
+              </a:lnSpc>
+              <a:spcAft>
+                <a:spcPts val="1000"/>
+              </a:spcAft>
+            </a:pPr>
+            <a:r>
+              <a:rPr lang="en-US" sz="1100" dirty="0">
+                <a:latin typeface="Courier New" panose="02070309020205020404" pitchFamily="49" charset="0"/>
+                <a:ea typeface="Roboto" charset="0"/>
+                <a:cs typeface="Courier New" panose="02070309020205020404" pitchFamily="49" charset="0"/>
+              </a:rPr>
+              <a:t>            --</a:t>
+            </a:r>
+            <a:r>
+              <a:rPr lang="en-US" sz="1100" dirty="0" err="1">
+                <a:latin typeface="Courier New" panose="02070309020205020404" pitchFamily="49" charset="0"/>
+                <a:ea typeface="Roboto" charset="0"/>
+                <a:cs typeface="Courier New" panose="02070309020205020404" pitchFamily="49" charset="0"/>
+              </a:rPr>
+              <a:t>databricks_pre_statements</a:t>
+            </a:r>
+            <a:r>
+              <a:rPr lang="en-US" sz="1100" dirty="0">
+                <a:latin typeface="Courier New" panose="02070309020205020404" pitchFamily="49" charset="0"/>
+                <a:ea typeface="Roboto" charset="0"/>
+                <a:cs typeface="Courier New" panose="02070309020205020404" pitchFamily="49" charset="0"/>
+              </a:rPr>
+              <a:t>=["SET </a:t>
+            </a:r>
+            <a:r>
+              <a:rPr lang="en-US" sz="1100" dirty="0" err="1">
+                <a:latin typeface="Courier New" panose="02070309020205020404" pitchFamily="49" charset="0"/>
+                <a:ea typeface="Roboto" charset="0"/>
+                <a:cs typeface="Courier New" panose="02070309020205020404" pitchFamily="49" charset="0"/>
+              </a:rPr>
+              <a:t>spark.sql.shuffle.partitions</a:t>
+            </a:r>
+            <a:r>
+              <a:rPr lang="en-US" sz="1100" dirty="0">
+                <a:latin typeface="Courier New" panose="02070309020205020404" pitchFamily="49" charset="0"/>
+                <a:ea typeface="Roboto" charset="0"/>
+                <a:cs typeface="Courier New" panose="02070309020205020404" pitchFamily="49" charset="0"/>
+              </a:rPr>
+              <a:t>=10"]</a:t>
+            </a:r>
+          </a:p>
+        </p:txBody>
+      </p:sp>
+    </p:spTree>
+    <p:extLst>
+      <p:ext uri="{BB962C8B-B14F-4D97-AF65-F5344CB8AC3E}">
+        <p14:creationId xmlns:p14="http://schemas.microsoft.com/office/powerpoint/2010/main" val="584359797"/>
       </p:ext>
     </p:extLst>
   </p:cSld>
@@ -27838,567 +28249,6 @@
         <p:cNvPr id="1" name="">
           <a:extLst>
             <a:ext uri="{FF2B5EF4-FFF2-40B4-BE49-F238E27FC236}">
-              <a16:creationId xmlns:a16="http://schemas.microsoft.com/office/drawing/2014/main" id="{6E97DB95-0030-BBE7-9EAF-AD2320A80700}"/>
-            </a:ext>
-          </a:extLst>
-        </p:cNvPr>
-        <p:cNvGrpSpPr/>
-        <p:nvPr/>
-      </p:nvGrpSpPr>
-      <p:grpSpPr>
-        <a:xfrm>
-          <a:off x="0" y="0"/>
-          <a:ext cx="0" cy="0"/>
-          <a:chOff x="0" y="0"/>
-          <a:chExt cx="0" cy="0"/>
-        </a:xfrm>
-      </p:grpSpPr>
-      <p:sp>
-        <p:nvSpPr>
-          <p:cNvPr id="5" name="Title 4">
-            <a:extLst>
-              <a:ext uri="{FF2B5EF4-FFF2-40B4-BE49-F238E27FC236}">
-                <a16:creationId xmlns:a16="http://schemas.microsoft.com/office/drawing/2014/main" id="{1DCCE66F-F0D7-5749-D059-7C2D0D00735A}"/>
-              </a:ext>
-            </a:extLst>
-          </p:cNvPr>
-          <p:cNvSpPr>
-            <a:spLocks noGrp="1"/>
-          </p:cNvSpPr>
-          <p:nvPr>
-            <p:ph type="title"/>
-          </p:nvPr>
-        </p:nvSpPr>
-        <p:spPr/>
-        <p:txBody>
-          <a:bodyPr/>
-          <a:lstStyle/>
-          <a:p>
-            <a:r>
-              <a:rPr lang="en-US" dirty="0"/>
-              <a:t>Optional Command Line Arguments (continued)</a:t>
-            </a:r>
-            <a:endParaRPr lang="en-IN" dirty="0"/>
-          </a:p>
-        </p:txBody>
-      </p:sp>
-      <p:sp>
-        <p:nvSpPr>
-          <p:cNvPr id="6" name="TextBox 5">
-            <a:extLst>
-              <a:ext uri="{FF2B5EF4-FFF2-40B4-BE49-F238E27FC236}">
-                <a16:creationId xmlns:a16="http://schemas.microsoft.com/office/drawing/2014/main" id="{1952A84B-2E7F-2DE6-FC4E-70F1B110D5C3}"/>
-              </a:ext>
-            </a:extLst>
-          </p:cNvPr>
-          <p:cNvSpPr txBox="1"/>
-          <p:nvPr/>
-        </p:nvSpPr>
-        <p:spPr>
-          <a:xfrm>
-            <a:off x="717176" y="1045029"/>
-            <a:ext cx="11195177" cy="5330369"/>
-          </a:xfrm>
-          <a:prstGeom prst="rect">
-            <a:avLst/>
-          </a:prstGeom>
-          <a:noFill/>
-        </p:spPr>
-        <p:txBody>
-          <a:bodyPr wrap="square" lIns="0" tIns="0" rIns="0" bIns="0" rtlCol="0">
-            <a:noAutofit/>
-          </a:bodyPr>
-          <a:lstStyle/>
-          <a:p>
-            <a:pPr>
-              <a:lnSpc>
-                <a:spcPct val="90000"/>
-              </a:lnSpc>
-              <a:spcAft>
-                <a:spcPts val="1000"/>
-              </a:spcAft>
-            </a:pPr>
-            <a:r>
-              <a:rPr lang="en-US" sz="1100" dirty="0">
-                <a:latin typeface="Courier New" panose="02070309020205020404" pitchFamily="49" charset="0"/>
-                <a:ea typeface="Roboto" charset="0"/>
-                <a:cs typeface="Courier New" panose="02070309020205020404" pitchFamily="49" charset="0"/>
-              </a:rPr>
-              <a:t> --</a:t>
-            </a:r>
-            <a:r>
-              <a:rPr lang="en-US" sz="1100" b="1" dirty="0" err="1">
-                <a:latin typeface="Courier New" panose="02070309020205020404" pitchFamily="49" charset="0"/>
-                <a:ea typeface="Roboto" charset="0"/>
-                <a:cs typeface="Courier New" panose="02070309020205020404" pitchFamily="49" charset="0"/>
-              </a:rPr>
-              <a:t>encrypted_jdbc_password</a:t>
-            </a:r>
-            <a:endParaRPr lang="en-US" sz="1100" b="1" dirty="0">
-              <a:latin typeface="Courier New" panose="02070309020205020404" pitchFamily="49" charset="0"/>
-              <a:ea typeface="Roboto" charset="0"/>
-              <a:cs typeface="Courier New" panose="02070309020205020404" pitchFamily="49" charset="0"/>
-            </a:endParaRPr>
-          </a:p>
-          <a:p>
-            <a:pPr>
-              <a:lnSpc>
-                <a:spcPct val="90000"/>
-              </a:lnSpc>
-              <a:spcAft>
-                <a:spcPts val="1000"/>
-              </a:spcAft>
-            </a:pPr>
-            <a:r>
-              <a:rPr lang="en-US" sz="1100" dirty="0">
-                <a:latin typeface="Courier New" panose="02070309020205020404" pitchFamily="49" charset="0"/>
-                <a:ea typeface="Roboto" charset="0"/>
-                <a:cs typeface="Courier New" panose="02070309020205020404" pitchFamily="49" charset="0"/>
-              </a:rPr>
-              <a:t>        (Databricks JDBC) Encrypted JDBC password.</a:t>
-            </a:r>
-          </a:p>
-          <a:p>
-            <a:pPr>
-              <a:lnSpc>
-                <a:spcPct val="90000"/>
-              </a:lnSpc>
-              <a:spcAft>
-                <a:spcPts val="1000"/>
-              </a:spcAft>
-            </a:pPr>
-            <a:r>
-              <a:rPr lang="en-US" sz="1100" dirty="0">
-                <a:latin typeface="Courier New" panose="02070309020205020404" pitchFamily="49" charset="0"/>
-                <a:ea typeface="Roboto" charset="0"/>
-                <a:cs typeface="Courier New" panose="02070309020205020404" pitchFamily="49" charset="0"/>
-              </a:rPr>
-              <a:t>		* See the Encryption related options to see how to create encrypted passwords</a:t>
-            </a:r>
-          </a:p>
-          <a:p>
-            <a:pPr>
-              <a:lnSpc>
-                <a:spcPct val="90000"/>
-              </a:lnSpc>
-              <a:spcAft>
-                <a:spcPts val="1000"/>
-              </a:spcAft>
-            </a:pPr>
-            <a:r>
-              <a:rPr lang="en-US" sz="1100" dirty="0">
-                <a:latin typeface="Courier New" panose="02070309020205020404" pitchFamily="49" charset="0"/>
-                <a:ea typeface="Roboto" charset="0"/>
-                <a:cs typeface="Courier New" panose="02070309020205020404" pitchFamily="49" charset="0"/>
-              </a:rPr>
-              <a:t>        If provided alongside --</a:t>
-            </a:r>
-            <a:r>
-              <a:rPr lang="en-US" sz="1100" dirty="0" err="1">
-                <a:latin typeface="Courier New" panose="02070309020205020404" pitchFamily="49" charset="0"/>
-                <a:ea typeface="Roboto" charset="0"/>
-                <a:cs typeface="Courier New" panose="02070309020205020404" pitchFamily="49" charset="0"/>
-              </a:rPr>
-              <a:t>jdbc_password</a:t>
-            </a:r>
-            <a:r>
-              <a:rPr lang="en-US" sz="1100" dirty="0">
-                <a:latin typeface="Courier New" panose="02070309020205020404" pitchFamily="49" charset="0"/>
-                <a:ea typeface="Roboto" charset="0"/>
-                <a:cs typeface="Courier New" panose="02070309020205020404" pitchFamily="49" charset="0"/>
-              </a:rPr>
-              <a:t>, this value will be used instead.</a:t>
-            </a:r>
-          </a:p>
-          <a:p>
-            <a:pPr>
-              <a:lnSpc>
-                <a:spcPct val="90000"/>
-              </a:lnSpc>
-              <a:spcAft>
-                <a:spcPts val="1000"/>
-              </a:spcAft>
-            </a:pPr>
-            <a:r>
-              <a:rPr lang="en-US" sz="1100" dirty="0">
-                <a:latin typeface="Courier New" panose="02070309020205020404" pitchFamily="49" charset="0"/>
-                <a:ea typeface="Roboto" charset="0"/>
-                <a:cs typeface="Courier New" panose="02070309020205020404" pitchFamily="49" charset="0"/>
-              </a:rPr>
-              <a:t>        The script will decrypt it automatically.</a:t>
-            </a:r>
-          </a:p>
-          <a:p>
-            <a:pPr>
-              <a:lnSpc>
-                <a:spcPct val="90000"/>
-              </a:lnSpc>
-              <a:spcAft>
-                <a:spcPts val="1000"/>
-              </a:spcAft>
-            </a:pPr>
-            <a:r>
-              <a:rPr lang="en-US" sz="1100" dirty="0">
-                <a:latin typeface="Courier New" panose="02070309020205020404" pitchFamily="49" charset="0"/>
-                <a:ea typeface="Roboto" charset="0"/>
-                <a:cs typeface="Courier New" panose="02070309020205020404" pitchFamily="49" charset="0"/>
-              </a:rPr>
-              <a:t>        Example:</a:t>
-            </a:r>
-          </a:p>
-          <a:p>
-            <a:pPr>
-              <a:lnSpc>
-                <a:spcPct val="90000"/>
-              </a:lnSpc>
-              <a:spcAft>
-                <a:spcPts val="1000"/>
-              </a:spcAft>
-            </a:pPr>
-            <a:r>
-              <a:rPr lang="en-US" sz="1100" dirty="0">
-                <a:latin typeface="Courier New" panose="02070309020205020404" pitchFamily="49" charset="0"/>
-                <a:ea typeface="Roboto" charset="0"/>
-                <a:cs typeface="Courier New" panose="02070309020205020404" pitchFamily="49" charset="0"/>
-              </a:rPr>
-              <a:t>            --</a:t>
-            </a:r>
-            <a:r>
-              <a:rPr lang="en-US" sz="1100" dirty="0" err="1">
-                <a:latin typeface="Courier New" panose="02070309020205020404" pitchFamily="49" charset="0"/>
-                <a:ea typeface="Roboto" charset="0"/>
-                <a:cs typeface="Courier New" panose="02070309020205020404" pitchFamily="49" charset="0"/>
-              </a:rPr>
-              <a:t>encrypted_jdbc_password</a:t>
-            </a:r>
-            <a:r>
-              <a:rPr lang="en-US" sz="1100" dirty="0">
-                <a:latin typeface="Courier New" panose="02070309020205020404" pitchFamily="49" charset="0"/>
-                <a:ea typeface="Roboto" charset="0"/>
-                <a:cs typeface="Courier New" panose="02070309020205020404" pitchFamily="49" charset="0"/>
-              </a:rPr>
-              <a:t>=gAAAAABn7rHu...</a:t>
-            </a:r>
-          </a:p>
-          <a:p>
-            <a:pPr>
-              <a:lnSpc>
-                <a:spcPct val="90000"/>
-              </a:lnSpc>
-              <a:spcAft>
-                <a:spcPts val="1000"/>
-              </a:spcAft>
-            </a:pPr>
-            <a:endParaRPr lang="en-US" sz="1100" dirty="0">
-              <a:latin typeface="Courier New" panose="02070309020205020404" pitchFamily="49" charset="0"/>
-              <a:ea typeface="Roboto" charset="0"/>
-              <a:cs typeface="Courier New" panose="02070309020205020404" pitchFamily="49" charset="0"/>
-            </a:endParaRPr>
-          </a:p>
-          <a:p>
-            <a:pPr>
-              <a:lnSpc>
-                <a:spcPct val="90000"/>
-              </a:lnSpc>
-              <a:spcAft>
-                <a:spcPts val="1000"/>
-              </a:spcAft>
-            </a:pPr>
-            <a:r>
-              <a:rPr lang="en-US" sz="1100" dirty="0">
-                <a:latin typeface="Courier New" panose="02070309020205020404" pitchFamily="49" charset="0"/>
-                <a:ea typeface="Roboto" charset="0"/>
-                <a:cs typeface="Courier New" panose="02070309020205020404" pitchFamily="49" charset="0"/>
-              </a:rPr>
-              <a:t> --</a:t>
-            </a:r>
-            <a:r>
-              <a:rPr lang="en-US" sz="1100" b="1" dirty="0" err="1">
-                <a:latin typeface="Courier New" panose="02070309020205020404" pitchFamily="49" charset="0"/>
-                <a:ea typeface="Roboto" charset="0"/>
-                <a:cs typeface="Courier New" panose="02070309020205020404" pitchFamily="49" charset="0"/>
-              </a:rPr>
-              <a:t>jdbc_driver_file</a:t>
-            </a:r>
-            <a:endParaRPr lang="en-US" sz="1100" b="1" dirty="0">
-              <a:latin typeface="Courier New" panose="02070309020205020404" pitchFamily="49" charset="0"/>
-              <a:ea typeface="Roboto" charset="0"/>
-              <a:cs typeface="Courier New" panose="02070309020205020404" pitchFamily="49" charset="0"/>
-            </a:endParaRPr>
-          </a:p>
-          <a:p>
-            <a:pPr>
-              <a:lnSpc>
-                <a:spcPct val="90000"/>
-              </a:lnSpc>
-              <a:spcAft>
-                <a:spcPts val="1000"/>
-              </a:spcAft>
-            </a:pPr>
-            <a:r>
-              <a:rPr lang="en-US" sz="1100" dirty="0">
-                <a:latin typeface="Courier New" panose="02070309020205020404" pitchFamily="49" charset="0"/>
-                <a:ea typeface="Roboto" charset="0"/>
-                <a:cs typeface="Courier New" panose="02070309020205020404" pitchFamily="49" charset="0"/>
-              </a:rPr>
-              <a:t>        (Databricks JDBC) File path to the JDBC driver JAR file.</a:t>
-            </a:r>
-          </a:p>
-          <a:p>
-            <a:pPr>
-              <a:lnSpc>
-                <a:spcPct val="90000"/>
-              </a:lnSpc>
-              <a:spcAft>
-                <a:spcPts val="1000"/>
-              </a:spcAft>
-            </a:pPr>
-            <a:r>
-              <a:rPr lang="en-US" sz="1100" dirty="0">
-                <a:latin typeface="Courier New" panose="02070309020205020404" pitchFamily="49" charset="0"/>
-                <a:ea typeface="Roboto" charset="0"/>
-                <a:cs typeface="Courier New" panose="02070309020205020404" pitchFamily="49" charset="0"/>
-              </a:rPr>
-              <a:t>		You can specify just a filename (which it will expect in the same directory as the python script,</a:t>
-            </a:r>
-          </a:p>
-          <a:p>
-            <a:pPr>
-              <a:lnSpc>
-                <a:spcPct val="90000"/>
-              </a:lnSpc>
-              <a:spcAft>
-                <a:spcPts val="1000"/>
-              </a:spcAft>
-            </a:pPr>
-            <a:r>
-              <a:rPr lang="en-US" sz="1100" dirty="0">
-                <a:latin typeface="Courier New" panose="02070309020205020404" pitchFamily="49" charset="0"/>
-                <a:ea typeface="Roboto" charset="0"/>
-                <a:cs typeface="Courier New" panose="02070309020205020404" pitchFamily="49" charset="0"/>
-              </a:rPr>
-              <a:t>		or you can specify a full path to where the jar file resides.</a:t>
-            </a:r>
-          </a:p>
-          <a:p>
-            <a:pPr>
-              <a:lnSpc>
-                <a:spcPct val="90000"/>
-              </a:lnSpc>
-              <a:spcAft>
-                <a:spcPts val="1000"/>
-              </a:spcAft>
-            </a:pPr>
-            <a:r>
-              <a:rPr lang="en-US" sz="1100" dirty="0">
-                <a:latin typeface="Courier New" panose="02070309020205020404" pitchFamily="49" charset="0"/>
-                <a:ea typeface="Roboto" charset="0"/>
-                <a:cs typeface="Courier New" panose="02070309020205020404" pitchFamily="49" charset="0"/>
-              </a:rPr>
-              <a:t>        Example:</a:t>
-            </a:r>
-          </a:p>
-          <a:p>
-            <a:pPr>
-              <a:lnSpc>
-                <a:spcPct val="90000"/>
-              </a:lnSpc>
-              <a:spcAft>
-                <a:spcPts val="1000"/>
-              </a:spcAft>
-            </a:pPr>
-            <a:r>
-              <a:rPr lang="en-US" sz="1100" dirty="0">
-                <a:latin typeface="Courier New" panose="02070309020205020404" pitchFamily="49" charset="0"/>
-                <a:ea typeface="Roboto" charset="0"/>
-                <a:cs typeface="Courier New" panose="02070309020205020404" pitchFamily="49" charset="0"/>
-              </a:rPr>
-              <a:t>            --</a:t>
-            </a:r>
-            <a:r>
-              <a:rPr lang="en-US" sz="1100" dirty="0" err="1">
-                <a:latin typeface="Courier New" panose="02070309020205020404" pitchFamily="49" charset="0"/>
-                <a:ea typeface="Roboto" charset="0"/>
-                <a:cs typeface="Courier New" panose="02070309020205020404" pitchFamily="49" charset="0"/>
-              </a:rPr>
-              <a:t>jdbc_driver_file</a:t>
-            </a:r>
-            <a:r>
-              <a:rPr lang="en-US" sz="1100" dirty="0">
-                <a:latin typeface="Courier New" panose="02070309020205020404" pitchFamily="49" charset="0"/>
-                <a:ea typeface="Roboto" charset="0"/>
-                <a:cs typeface="Courier New" panose="02070309020205020404" pitchFamily="49" charset="0"/>
-              </a:rPr>
-              <a:t>=./DatabricksJDBC42.jar</a:t>
-            </a:r>
-          </a:p>
-          <a:p>
-            <a:pPr>
-              <a:lnSpc>
-                <a:spcPct val="90000"/>
-              </a:lnSpc>
-              <a:spcAft>
-                <a:spcPts val="1000"/>
-              </a:spcAft>
-            </a:pPr>
-            <a:endParaRPr lang="en-US" sz="1100" dirty="0">
-              <a:latin typeface="Courier New" panose="02070309020205020404" pitchFamily="49" charset="0"/>
-              <a:ea typeface="Roboto" charset="0"/>
-              <a:cs typeface="Courier New" panose="02070309020205020404" pitchFamily="49" charset="0"/>
-            </a:endParaRPr>
-          </a:p>
-          <a:p>
-            <a:pPr>
-              <a:lnSpc>
-                <a:spcPct val="90000"/>
-              </a:lnSpc>
-              <a:spcAft>
-                <a:spcPts val="1000"/>
-              </a:spcAft>
-            </a:pPr>
-            <a:r>
-              <a:rPr lang="en-US" sz="1100" dirty="0">
-                <a:latin typeface="Courier New" panose="02070309020205020404" pitchFamily="49" charset="0"/>
-                <a:ea typeface="Roboto" charset="0"/>
-                <a:cs typeface="Courier New" panose="02070309020205020404" pitchFamily="49" charset="0"/>
-              </a:rPr>
-              <a:t> --</a:t>
-            </a:r>
-            <a:r>
-              <a:rPr lang="en-US" sz="1100" b="1" dirty="0" err="1">
-                <a:latin typeface="Courier New" panose="02070309020205020404" pitchFamily="49" charset="0"/>
-                <a:ea typeface="Roboto" charset="0"/>
-                <a:cs typeface="Courier New" panose="02070309020205020404" pitchFamily="49" charset="0"/>
-              </a:rPr>
-              <a:t>databricks_pre_statements</a:t>
-            </a:r>
-            <a:endParaRPr lang="en-US" sz="1100" b="1" dirty="0">
-              <a:latin typeface="Courier New" panose="02070309020205020404" pitchFamily="49" charset="0"/>
-              <a:ea typeface="Roboto" charset="0"/>
-              <a:cs typeface="Courier New" panose="02070309020205020404" pitchFamily="49" charset="0"/>
-            </a:endParaRPr>
-          </a:p>
-          <a:p>
-            <a:pPr>
-              <a:lnSpc>
-                <a:spcPct val="90000"/>
-              </a:lnSpc>
-              <a:spcAft>
-                <a:spcPts val="1000"/>
-              </a:spcAft>
-            </a:pPr>
-            <a:r>
-              <a:rPr lang="en-US" sz="1100" dirty="0">
-                <a:latin typeface="Courier New" panose="02070309020205020404" pitchFamily="49" charset="0"/>
-                <a:ea typeface="Roboto" charset="0"/>
-                <a:cs typeface="Courier New" panose="02070309020205020404" pitchFamily="49" charset="0"/>
-              </a:rPr>
-              <a:t>        (Databricks) List of SQL statements to execute prior to main operations.</a:t>
-            </a:r>
-          </a:p>
-          <a:p>
-            <a:pPr>
-              <a:lnSpc>
-                <a:spcPct val="90000"/>
-              </a:lnSpc>
-              <a:spcAft>
-                <a:spcPts val="1000"/>
-              </a:spcAft>
-            </a:pPr>
-            <a:r>
-              <a:rPr lang="en-US" sz="1100" dirty="0">
-                <a:latin typeface="Courier New" panose="02070309020205020404" pitchFamily="49" charset="0"/>
-                <a:ea typeface="Roboto" charset="0"/>
-                <a:cs typeface="Courier New" panose="02070309020205020404" pitchFamily="49" charset="0"/>
-              </a:rPr>
-              <a:t>        Example:</a:t>
-            </a:r>
-          </a:p>
-          <a:p>
-            <a:pPr>
-              <a:lnSpc>
-                <a:spcPct val="90000"/>
-              </a:lnSpc>
-              <a:spcAft>
-                <a:spcPts val="1000"/>
-              </a:spcAft>
-            </a:pPr>
-            <a:r>
-              <a:rPr lang="en-US" sz="1100" dirty="0">
-                <a:latin typeface="Courier New" panose="02070309020205020404" pitchFamily="49" charset="0"/>
-                <a:ea typeface="Roboto" charset="0"/>
-                <a:cs typeface="Courier New" panose="02070309020205020404" pitchFamily="49" charset="0"/>
-              </a:rPr>
-              <a:t>            --</a:t>
-            </a:r>
-            <a:r>
-              <a:rPr lang="en-US" sz="1100" dirty="0" err="1">
-                <a:latin typeface="Courier New" panose="02070309020205020404" pitchFamily="49" charset="0"/>
-                <a:ea typeface="Roboto" charset="0"/>
-                <a:cs typeface="Courier New" panose="02070309020205020404" pitchFamily="49" charset="0"/>
-              </a:rPr>
-              <a:t>databricks_pre_statements</a:t>
-            </a:r>
-            <a:r>
-              <a:rPr lang="en-US" sz="1100" dirty="0">
-                <a:latin typeface="Courier New" panose="02070309020205020404" pitchFamily="49" charset="0"/>
-                <a:ea typeface="Roboto" charset="0"/>
-                <a:cs typeface="Courier New" panose="02070309020205020404" pitchFamily="49" charset="0"/>
-              </a:rPr>
-              <a:t>=["SET </a:t>
-            </a:r>
-            <a:r>
-              <a:rPr lang="en-US" sz="1100" dirty="0" err="1">
-                <a:latin typeface="Courier New" panose="02070309020205020404" pitchFamily="49" charset="0"/>
-                <a:ea typeface="Roboto" charset="0"/>
-                <a:cs typeface="Courier New" panose="02070309020205020404" pitchFamily="49" charset="0"/>
-              </a:rPr>
-              <a:t>spark.sql.shuffle.partitions</a:t>
-            </a:r>
-            <a:r>
-              <a:rPr lang="en-US" sz="1100" dirty="0">
-                <a:latin typeface="Courier New" panose="02070309020205020404" pitchFamily="49" charset="0"/>
-                <a:ea typeface="Roboto" charset="0"/>
-                <a:cs typeface="Courier New" panose="02070309020205020404" pitchFamily="49" charset="0"/>
-              </a:rPr>
-              <a:t>=10"]</a:t>
-            </a:r>
-          </a:p>
-        </p:txBody>
-      </p:sp>
-    </p:spTree>
-    <p:extLst>
-      <p:ext uri="{BB962C8B-B14F-4D97-AF65-F5344CB8AC3E}">
-        <p14:creationId xmlns:p14="http://schemas.microsoft.com/office/powerpoint/2010/main" val="584359797"/>
-      </p:ext>
-    </p:extLst>
-  </p:cSld>
-  <p:clrMapOvr>
-    <a:masterClrMapping/>
-  </p:clrMapOvr>
-  <mc:AlternateContent xmlns:mc="http://schemas.openxmlformats.org/markup-compatibility/2006" xmlns:p14="http://schemas.microsoft.com/office/powerpoint/2010/main">
-    <mc:Choice Requires="p14">
-      <p:transition spd="med" p14:dur="700" advClick="0">
-        <p:fade/>
-      </p:transition>
-    </mc:Choice>
-    <mc:Fallback xmlns="">
-      <p:transition spd="med" advClick="0">
-        <p:fade/>
-      </p:transition>
-    </mc:Fallback>
-  </mc:AlternateContent>
-</p:sld>
-</file>
-
-<file path=ppt/slides/slide21.xml><?xml version="1.0" encoding="utf-8"?>
-<p:sld xmlns:a="http://schemas.openxmlformats.org/drawingml/2006/main" xmlns:r="http://schemas.openxmlformats.org/officeDocument/2006/relationships" xmlns:p="http://schemas.openxmlformats.org/presentationml/2006/main">
-  <p:cSld>
-    <p:spTree>
-      <p:nvGrpSpPr>
-        <p:cNvPr id="1" name="">
-          <a:extLst>
-            <a:ext uri="{FF2B5EF4-FFF2-40B4-BE49-F238E27FC236}">
               <a16:creationId xmlns:a16="http://schemas.microsoft.com/office/drawing/2014/main" id="{8B964BBB-7921-36F0-3521-B56ADAD1E54F}"/>
             </a:ext>
           </a:extLst>
@@ -28714,7 +28564,7 @@
 </p:sld>
 </file>
 
-<file path=ppt/slides/slide22.xml><?xml version="1.0" encoding="utf-8"?>
+<file path=ppt/slides/slide21.xml><?xml version="1.0" encoding="utf-8"?>
 <p:sld xmlns:a="http://schemas.openxmlformats.org/drawingml/2006/main" xmlns:r="http://schemas.openxmlformats.org/officeDocument/2006/relationships" xmlns:p="http://schemas.openxmlformats.org/presentationml/2006/main">
   <p:cSld>
     <p:spTree>
@@ -29124,7 +28974,7 @@
 </p:sld>
 </file>
 
-<file path=ppt/slides/slide23.xml><?xml version="1.0" encoding="utf-8"?>
+<file path=ppt/slides/slide22.xml><?xml version="1.0" encoding="utf-8"?>
 <p:sld xmlns:a="http://schemas.openxmlformats.org/drawingml/2006/main" xmlns:r="http://schemas.openxmlformats.org/officeDocument/2006/relationships" xmlns:p="http://schemas.openxmlformats.org/presentationml/2006/main">
   <p:cSld>
     <p:spTree>
@@ -30937,6 +30787,36 @@
           <a:chExt cx="0" cy="0"/>
         </a:xfrm>
       </p:grpSpPr>
+      <p:pic>
+        <p:nvPicPr>
+          <p:cNvPr id="4" name="Picture 3">
+            <a:extLst>
+              <a:ext uri="{FF2B5EF4-FFF2-40B4-BE49-F238E27FC236}">
+                <a16:creationId xmlns:a16="http://schemas.microsoft.com/office/drawing/2014/main" id="{8B532996-3836-DA24-D3D6-687286418C71}"/>
+              </a:ext>
+            </a:extLst>
+          </p:cNvPr>
+          <p:cNvPicPr>
+            <a:picLocks noChangeAspect="1"/>
+          </p:cNvPicPr>
+          <p:nvPr/>
+        </p:nvPicPr>
+        <p:blipFill>
+          <a:blip r:embed="rId3"/>
+          <a:stretch>
+            <a:fillRect/>
+          </a:stretch>
+        </p:blipFill>
+        <p:spPr>
+          <a:xfrm>
+            <a:off x="5539172" y="1503867"/>
+            <a:ext cx="4578633" cy="4711460"/>
+          </a:xfrm>
+          <a:prstGeom prst="rect">
+            <a:avLst/>
+          </a:prstGeom>
+        </p:spPr>
+      </p:pic>
       <p:sp>
         <p:nvSpPr>
           <p:cNvPr id="5" name="Title 4">
@@ -31265,7 +31145,43 @@
                 <a:ea typeface="Roboto" charset="0"/>
                 <a:cs typeface="Roboto" charset="0"/>
               </a:rPr>
-              <a:t>JDBC Driver URL, User and Password (encrypted) for Databricks</a:t>
+              <a:t>Hostname, Port, and </a:t>
+            </a:r>
+            <a:r>
+              <a:rPr lang="en-US" sz="1200" dirty="0" err="1">
+                <a:latin typeface="Roboto" charset="0"/>
+                <a:ea typeface="Roboto" charset="0"/>
+                <a:cs typeface="Roboto" charset="0"/>
+              </a:rPr>
+              <a:t>httpPath</a:t>
+            </a:r>
+            <a:r>
+              <a:rPr lang="en-US" sz="1200" dirty="0">
+                <a:latin typeface="Roboto" charset="0"/>
+                <a:ea typeface="Roboto" charset="0"/>
+                <a:cs typeface="Roboto" charset="0"/>
+              </a:rPr>
+              <a:t> for Databricks</a:t>
+            </a:r>
+          </a:p>
+          <a:p>
+            <a:pPr marL="285750" indent="-285750">
+              <a:lnSpc>
+                <a:spcPct val="90000"/>
+              </a:lnSpc>
+              <a:spcAft>
+                <a:spcPts val="1000"/>
+              </a:spcAft>
+              <a:buFont typeface="Arial" panose="020B0604020202020204" pitchFamily="34" charset="0"/>
+              <a:buChar char="•"/>
+            </a:pPr>
+            <a:r>
+              <a:rPr lang="en-US" sz="1200" dirty="0">
+                <a:latin typeface="Roboto" charset="0"/>
+                <a:ea typeface="Roboto" charset="0"/>
+                <a:cs typeface="Roboto" charset="0"/>
+              </a:rPr>
+              <a:t>Databricks token value</a:t>
             </a:r>
           </a:p>
           <a:p>
@@ -31325,9 +31241,9 @@
           <p:nvPr/>
         </p:nvCxnSpPr>
         <p:spPr>
-          <a:xfrm>
-            <a:off x="3758135" y="2226982"/>
-            <a:ext cx="1416486" cy="94876"/>
+          <a:xfrm flipV="1">
+            <a:off x="3758135" y="2221639"/>
+            <a:ext cx="1781037" cy="5343"/>
           </a:xfrm>
           <a:prstGeom prst="straightConnector1">
             <a:avLst/>
@@ -31369,9 +31285,9 @@
           <p:nvPr/>
         </p:nvCxnSpPr>
         <p:spPr>
-          <a:xfrm>
-            <a:off x="3735851" y="2610178"/>
-            <a:ext cx="1438770" cy="100219"/>
+          <a:xfrm flipV="1">
+            <a:off x="3735851" y="2641883"/>
+            <a:ext cx="1645041" cy="4370"/>
           </a:xfrm>
           <a:prstGeom prst="straightConnector1">
             <a:avLst/>
@@ -31414,8 +31330,8 @@
         </p:nvCxnSpPr>
         <p:spPr>
           <a:xfrm flipV="1">
-            <a:off x="2935111" y="4058287"/>
-            <a:ext cx="2225941" cy="605157"/>
+            <a:off x="2935111" y="3752456"/>
+            <a:ext cx="2604061" cy="910988"/>
           </a:xfrm>
           <a:prstGeom prst="straightConnector1">
             <a:avLst/>
@@ -31458,8 +31374,8 @@
         </p:nvCxnSpPr>
         <p:spPr>
           <a:xfrm flipV="1">
-            <a:off x="3716071" y="3339976"/>
-            <a:ext cx="1444981" cy="526723"/>
+            <a:off x="3716071" y="3228835"/>
+            <a:ext cx="1664821" cy="637864"/>
           </a:xfrm>
           <a:prstGeom prst="straightConnector1">
             <a:avLst/>
@@ -31502,8 +31418,8 @@
         </p:nvCxnSpPr>
         <p:spPr>
           <a:xfrm flipV="1">
-            <a:off x="3758135" y="3050964"/>
-            <a:ext cx="1416486" cy="177871"/>
+            <a:off x="3758135" y="2949123"/>
+            <a:ext cx="1622757" cy="279712"/>
           </a:xfrm>
           <a:prstGeom prst="straightConnector1">
             <a:avLst/>
@@ -31545,9 +31461,9 @@
           <p:nvPr/>
         </p:nvCxnSpPr>
         <p:spPr>
-          <a:xfrm>
+          <a:xfrm flipV="1">
             <a:off x="2071019" y="5709731"/>
-            <a:ext cx="3090033" cy="0"/>
+            <a:ext cx="3309873" cy="140084"/>
           </a:xfrm>
           <a:prstGeom prst="straightConnector1">
             <a:avLst/>
@@ -31590,8 +31506,8 @@
         </p:nvCxnSpPr>
         <p:spPr>
           <a:xfrm flipV="1">
-            <a:off x="3165231" y="4896881"/>
-            <a:ext cx="1995821" cy="352857"/>
+            <a:off x="3165231" y="4320953"/>
+            <a:ext cx="2261599" cy="928785"/>
           </a:xfrm>
           <a:prstGeom prst="straightConnector1">
             <a:avLst/>
@@ -31629,13 +31545,14 @@
           </p:cNvPr>
           <p:cNvCxnSpPr>
             <a:cxnSpLocks/>
+            <a:endCxn id="4" idx="1"/>
           </p:cNvCxnSpPr>
           <p:nvPr/>
         </p:nvCxnSpPr>
         <p:spPr>
           <a:xfrm flipV="1">
-            <a:off x="3045017" y="4243369"/>
-            <a:ext cx="2116035" cy="710592"/>
+            <a:off x="3045017" y="3859597"/>
+            <a:ext cx="2494155" cy="1094364"/>
           </a:xfrm>
           <a:prstGeom prst="straightConnector1">
             <a:avLst/>
@@ -31673,14 +31590,13 @@
           </p:cNvPr>
           <p:cNvCxnSpPr>
             <a:cxnSpLocks/>
-            <a:endCxn id="3" idx="1"/>
           </p:cNvCxnSpPr>
           <p:nvPr/>
         </p:nvCxnSpPr>
         <p:spPr>
           <a:xfrm flipV="1">
-            <a:off x="3423138" y="3866699"/>
-            <a:ext cx="1751483" cy="392318"/>
+            <a:off x="3423138" y="3429000"/>
+            <a:ext cx="2116034" cy="830017"/>
           </a:xfrm>
           <a:prstGeom prst="straightConnector1">
             <a:avLst/>
@@ -31722,9 +31638,9 @@
           <p:nvPr/>
         </p:nvCxnSpPr>
         <p:spPr>
-          <a:xfrm>
-            <a:off x="2223911" y="6029920"/>
-            <a:ext cx="2937141" cy="139805"/>
+          <a:xfrm flipV="1">
+            <a:off x="2223911" y="6084277"/>
+            <a:ext cx="3156981" cy="85448"/>
           </a:xfrm>
           <a:prstGeom prst="straightConnector1">
             <a:avLst/>
@@ -31751,36 +31667,50 @@
           </a:fontRef>
         </p:style>
       </p:cxnSp>
-      <p:pic>
-        <p:nvPicPr>
-          <p:cNvPr id="3" name="Picture 2">
+      <p:cxnSp>
+        <p:nvCxnSpPr>
+          <p:cNvPr id="24" name="Straight Arrow Connector 23">
             <a:extLst>
               <a:ext uri="{FF2B5EF4-FFF2-40B4-BE49-F238E27FC236}">
-                <a16:creationId xmlns:a16="http://schemas.microsoft.com/office/drawing/2014/main" id="{60E51846-EC42-426D-7025-0C49CC7C56F0}"/>
+                <a16:creationId xmlns:a16="http://schemas.microsoft.com/office/drawing/2014/main" id="{6E6AC0FC-2B47-FAE2-8C36-D6867696C68E}"/>
               </a:ext>
             </a:extLst>
           </p:cNvPr>
-          <p:cNvPicPr>
-            <a:picLocks noChangeAspect="1"/>
-          </p:cNvPicPr>
+          <p:cNvCxnSpPr>
+            <a:cxnSpLocks/>
+          </p:cNvCxnSpPr>
           <p:nvPr/>
-        </p:nvPicPr>
-        <p:blipFill>
-          <a:blip r:embed="rId3"/>
-          <a:stretch>
-            <a:fillRect/>
-          </a:stretch>
-        </p:blipFill>
+        </p:nvCxnSpPr>
         <p:spPr>
-          <a:xfrm>
-            <a:off x="5174621" y="1418432"/>
-            <a:ext cx="5420481" cy="4896533"/>
+          <a:xfrm flipV="1">
+            <a:off x="2223911" y="5334000"/>
+            <a:ext cx="3202919" cy="246778"/>
           </a:xfrm>
-          <a:prstGeom prst="rect">
+          <a:prstGeom prst="straightConnector1">
             <a:avLst/>
           </a:prstGeom>
+          <a:ln w="19050">
+            <a:solidFill>
+              <a:schemeClr val="tx1"/>
+            </a:solidFill>
+            <a:tailEnd type="triangle"/>
+          </a:ln>
         </p:spPr>
-      </p:pic>
+        <p:style>
+          <a:lnRef idx="1">
+            <a:schemeClr val="accent1"/>
+          </a:lnRef>
+          <a:fillRef idx="0">
+            <a:schemeClr val="accent1"/>
+          </a:fillRef>
+          <a:effectRef idx="0">
+            <a:schemeClr val="accent1"/>
+          </a:effectRef>
+          <a:fontRef idx="minor">
+            <a:schemeClr val="tx1"/>
+          </a:fontRef>
+        </p:style>
+      </p:cxnSp>
     </p:spTree>
     <p:extLst>
       <p:ext uri="{BB962C8B-B14F-4D97-AF65-F5344CB8AC3E}">

</xml_diff>